<commit_message>
Final game pitch video and presentation added
- Final presentation with Blender mock up added to video and presentation slides
</commit_message>
<xml_diff>
--- a/Project Documents/Kezzel Run Pitch Presentation.pptx
+++ b/Project Documents/Kezzel Run Pitch Presentation.pptx
@@ -20,34 +20,35 @@
     <p:sldId id="264" r:id="rId15"/>
     <p:sldId id="265" r:id="rId16"/>
     <p:sldId id="266" r:id="rId17"/>
+    <p:sldId id="267" r:id="rId18"/>
   </p:sldIdLst>
   <p:sldSz cy="5143500" cx="9144000"/>
   <p:notesSz cx="6858000" cy="9144000"/>
   <p:embeddedFontLst>
     <p:embeddedFont>
       <p:font typeface="Zen Dots"/>
-      <p:regular r:id="rId18"/>
+      <p:regular r:id="rId19"/>
     </p:embeddedFont>
     <p:embeddedFont>
       <p:font typeface="Inter SemiBold"/>
-      <p:regular r:id="rId19"/>
-      <p:bold r:id="rId20"/>
-      <p:italic r:id="rId21"/>
-      <p:boldItalic r:id="rId22"/>
+      <p:regular r:id="rId20"/>
+      <p:bold r:id="rId21"/>
+      <p:italic r:id="rId22"/>
+      <p:boldItalic r:id="rId23"/>
     </p:embeddedFont>
     <p:embeddedFont>
       <p:font typeface="Inter Light"/>
-      <p:regular r:id="rId23"/>
-      <p:bold r:id="rId24"/>
-      <p:italic r:id="rId25"/>
-      <p:boldItalic r:id="rId26"/>
+      <p:regular r:id="rId24"/>
+      <p:bold r:id="rId25"/>
+      <p:italic r:id="rId26"/>
+      <p:boldItalic r:id="rId27"/>
     </p:embeddedFont>
     <p:embeddedFont>
       <p:font typeface="Inter"/>
-      <p:regular r:id="rId27"/>
-      <p:bold r:id="rId28"/>
-      <p:italic r:id="rId29"/>
-      <p:boldItalic r:id="rId30"/>
+      <p:regular r:id="rId28"/>
+      <p:bold r:id="rId29"/>
+      <p:italic r:id="rId30"/>
+      <p:boldItalic r:id="rId31"/>
     </p:embeddedFont>
   </p:embeddedFontLst>
   <p:defaultTextStyle>
@@ -842,7 +843,7 @@
       </p:grpSpPr>
       <p:sp>
         <p:nvSpPr>
-          <p:cNvPr id="442" name="Google Shape;442;g3299fa52606_6_1:notes"/>
+          <p:cNvPr id="442" name="Google Shape;442;g329e9d34ee3_0_0:notes"/>
           <p:cNvSpPr/>
           <p:nvPr>
             <p:ph idx="2" type="sldImg"/>
@@ -877,7 +878,7 @@
       </p:sp>
       <p:sp>
         <p:nvSpPr>
-          <p:cNvPr id="443" name="Google Shape;443;g3299fa52606_6_1:notes"/>
+          <p:cNvPr id="443" name="Google Shape;443;g329e9d34ee3_0_0:notes"/>
           <p:cNvSpPr txBox="1"/>
           <p:nvPr>
             <p:ph idx="1" type="body"/>
@@ -941,7 +942,7 @@
       </p:grpSpPr>
       <p:sp>
         <p:nvSpPr>
-          <p:cNvPr id="448" name="Google Shape;448;g329916b113e_0_82:notes"/>
+          <p:cNvPr id="448" name="Google Shape;448;g3299fa52606_6_1:notes"/>
           <p:cNvSpPr/>
           <p:nvPr>
             <p:ph idx="2" type="sldImg"/>
@@ -976,7 +977,106 @@
       </p:sp>
       <p:sp>
         <p:nvSpPr>
-          <p:cNvPr id="449" name="Google Shape;449;g329916b113e_0_82:notes"/>
+          <p:cNvPr id="449" name="Google Shape;449;g3299fa52606_6_1:notes"/>
+          <p:cNvSpPr txBox="1"/>
+          <p:nvPr>
+            <p:ph idx="1" type="body"/>
+          </p:nvPr>
+        </p:nvSpPr>
+        <p:spPr>
+          <a:xfrm>
+            <a:off x="685800" y="4343400"/>
+            <a:ext cx="5486400" cy="4114800"/>
+          </a:xfrm>
+          <a:prstGeom prst="rect">
+            <a:avLst/>
+          </a:prstGeom>
+        </p:spPr>
+        <p:txBody>
+          <a:bodyPr anchorCtr="0" anchor="t" bIns="91425" lIns="91425" spcFirstLastPara="1" rIns="91425" wrap="square" tIns="91425">
+            <a:noAutofit/>
+          </a:bodyPr>
+          <a:lstStyle/>
+          <a:p>
+            <a:pPr indent="0" lvl="0" marL="0" rtl="0" algn="l">
+              <a:spcBef>
+                <a:spcPts val="0"/>
+              </a:spcBef>
+              <a:spcAft>
+                <a:spcPts val="0"/>
+              </a:spcAft>
+              <a:buNone/>
+            </a:pPr>
+            <a:r>
+              <a:t/>
+            </a:r>
+            <a:endParaRPr/>
+          </a:p>
+        </p:txBody>
+      </p:sp>
+    </p:spTree>
+  </p:cSld>
+  <p:clrMapOvr>
+    <a:masterClrMapping/>
+  </p:clrMapOvr>
+</p:notes>
+</file>
+
+<file path=ppt/notesSlides/notesSlide12.xml><?xml version="1.0" encoding="utf-8"?>
+<p:notes xmlns:a="http://schemas.openxmlformats.org/drawingml/2006/main" xmlns:r="http://schemas.openxmlformats.org/officeDocument/2006/relationships" xmlns:mc="http://schemas.openxmlformats.org/markup-compatibility/2006" xmlns:mv="urn:schemas-microsoft-com:mac:vml" xmlns:p="http://schemas.openxmlformats.org/presentationml/2006/main" xmlns:c="http://schemas.openxmlformats.org/drawingml/2006/chart" xmlns:dgm="http://schemas.openxmlformats.org/drawingml/2006/diagram" xmlns:o="urn:schemas-microsoft-com:office:office" xmlns:v="urn:schemas-microsoft-com:vml" xmlns:pvml="urn:schemas-microsoft-com:office:powerpoint" xmlns:com="http://schemas.openxmlformats.org/drawingml/2006/compatibility" xmlns:p14="http://schemas.microsoft.com/office/powerpoint/2010/main" xmlns:p15="http://schemas.microsoft.com/office/powerpoint/2012/main" xmlns:ahyp="http://schemas.microsoft.com/office/drawing/2018/hyperlinkcolor" showMasterPhAnim="0" showMasterSp="0">
+  <p:cSld>
+    <p:spTree>
+      <p:nvGrpSpPr>
+        <p:cNvPr id="453" name="Shape 453"/>
+        <p:cNvGrpSpPr/>
+        <p:nvPr/>
+      </p:nvGrpSpPr>
+      <p:grpSpPr>
+        <a:xfrm>
+          <a:off x="0" y="0"/>
+          <a:ext cx="0" cy="0"/>
+          <a:chOff x="0" y="0"/>
+          <a:chExt cx="0" cy="0"/>
+        </a:xfrm>
+      </p:grpSpPr>
+      <p:sp>
+        <p:nvSpPr>
+          <p:cNvPr id="454" name="Google Shape;454;g329916b113e_0_82:notes"/>
+          <p:cNvSpPr/>
+          <p:nvPr>
+            <p:ph idx="2" type="sldImg"/>
+          </p:nvPr>
+        </p:nvSpPr>
+        <p:spPr>
+          <a:xfrm>
+            <a:off x="381300" y="685800"/>
+            <a:ext cx="6096000" cy="3429000"/>
+          </a:xfrm>
+          <a:custGeom>
+            <a:rect b="b" l="l" r="r" t="t"/>
+            <a:pathLst>
+              <a:path extrusionOk="0" h="120000" w="120000">
+                <a:moveTo>
+                  <a:pt x="0" y="0"/>
+                </a:moveTo>
+                <a:lnTo>
+                  <a:pt x="120000" y="0"/>
+                </a:lnTo>
+                <a:lnTo>
+                  <a:pt x="120000" y="120000"/>
+                </a:lnTo>
+                <a:lnTo>
+                  <a:pt x="0" y="120000"/>
+                </a:lnTo>
+                <a:close/>
+              </a:path>
+            </a:pathLst>
+          </a:custGeom>
+        </p:spPr>
+      </p:sp>
+      <p:sp>
+        <p:nvSpPr>
+          <p:cNvPr id="455" name="Google Shape;455;g329916b113e_0_82:notes"/>
           <p:cNvSpPr txBox="1"/>
           <p:nvPr>
             <p:ph idx="1" type="body"/>
@@ -38478,176 +38578,159 @@
           <p:cNvPr id="445" name="Google Shape;445;p64"/>
           <p:cNvSpPr txBox="1"/>
           <p:nvPr>
-            <p:ph idx="1" type="body"/>
+            <p:ph type="title"/>
           </p:nvPr>
         </p:nvSpPr>
         <p:spPr>
           <a:xfrm>
-            <a:off x="311700" y="1152475"/>
-            <a:ext cx="8520600" cy="3416400"/>
+            <a:off x="2347800" y="-766525"/>
+            <a:ext cx="4448400" cy="2312700"/>
           </a:xfrm>
           <a:prstGeom prst="rect">
             <a:avLst/>
           </a:prstGeom>
         </p:spPr>
         <p:txBody>
-          <a:bodyPr anchorCtr="0" anchor="t" bIns="91425" lIns="91425" spcFirstLastPara="1" rIns="91425" wrap="square" tIns="91425">
+          <a:bodyPr anchorCtr="0" anchor="ctr" bIns="91425" lIns="91425" spcFirstLastPara="1" rIns="91425" wrap="square" tIns="91425">
             <a:noAutofit/>
           </a:bodyPr>
           <a:lstStyle/>
           <a:p>
-            <a:pPr indent="-304800" lvl="0" marL="457200" rtl="0" algn="l">
-              <a:spcBef>
-                <a:spcPts val="0"/>
-              </a:spcBef>
-              <a:spcAft>
-                <a:spcPts val="0"/>
-              </a:spcAft>
-              <a:buSzPts val="1200"/>
-              <a:buChar char="-"/>
+            <a:pPr indent="0" lvl="0" marL="0" rtl="0" algn="ctr">
+              <a:spcBef>
+                <a:spcPts val="0"/>
+              </a:spcBef>
+              <a:spcAft>
+                <a:spcPts val="0"/>
+              </a:spcAft>
+              <a:buNone/>
             </a:pPr>
             <a:r>
               <a:rPr lang="en"/>
-              <a:t>Retro Style Music and Sound Effects</a:t>
-            </a:r>
-            <a:endParaRPr/>
-          </a:p>
-          <a:p>
-            <a:pPr indent="-304800" lvl="0" marL="457200" rtl="0" algn="l">
-              <a:spcBef>
-                <a:spcPts val="0"/>
-              </a:spcBef>
-              <a:spcAft>
-                <a:spcPts val="0"/>
-              </a:spcAft>
-              <a:buSzPts val="1200"/>
-              <a:buChar char="-"/>
-            </a:pPr>
-            <a:r>
-              <a:rPr lang="en"/>
-              <a:t>Shooting and explosion sound effects</a:t>
-            </a:r>
-            <a:endParaRPr/>
-          </a:p>
-          <a:p>
-            <a:pPr indent="-304800" lvl="0" marL="457200" rtl="0" algn="l">
-              <a:spcBef>
-                <a:spcPts val="0"/>
-              </a:spcBef>
-              <a:spcAft>
-                <a:spcPts val="0"/>
-              </a:spcAft>
-              <a:buSzPts val="1200"/>
-              <a:buChar char="-"/>
-            </a:pPr>
-            <a:r>
-              <a:rPr lang="en"/>
-              <a:t>3 different songs, 1 for title screen, 1 for in game, and 1 left for ending </a:t>
-            </a:r>
-            <a:r>
-              <a:rPr lang="en"/>
-              <a:t>screen or as back up use</a:t>
-            </a:r>
-            <a:endParaRPr/>
-          </a:p>
-          <a:p>
-            <a:pPr indent="-304800" lvl="0" marL="457200" rtl="0" algn="l">
-              <a:spcBef>
-                <a:spcPts val="0"/>
-              </a:spcBef>
-              <a:spcAft>
-                <a:spcPts val="0"/>
-              </a:spcAft>
-              <a:buSzPts val="1200"/>
-              <a:buChar char="-"/>
-            </a:pPr>
-            <a:r>
-              <a:rPr lang="en"/>
-              <a:t>Title song is upbeat</a:t>
-            </a:r>
-            <a:endParaRPr/>
-          </a:p>
-          <a:p>
-            <a:pPr indent="-304800" lvl="0" marL="457200" rtl="0" algn="l">
-              <a:spcBef>
-                <a:spcPts val="0"/>
-              </a:spcBef>
-              <a:spcAft>
-                <a:spcPts val="0"/>
-              </a:spcAft>
-              <a:buSzPts val="1200"/>
-              <a:buChar char="-"/>
-            </a:pPr>
-            <a:r>
-              <a:rPr lang="en"/>
-              <a:t>Ingame song is all around and nonstop</a:t>
-            </a:r>
-            <a:endParaRPr/>
-          </a:p>
-          <a:p>
-            <a:pPr indent="-304800" lvl="0" marL="457200" rtl="0" algn="l">
-              <a:spcBef>
-                <a:spcPts val="0"/>
-              </a:spcBef>
-              <a:spcAft>
-                <a:spcPts val="0"/>
-              </a:spcAft>
-              <a:buSzPts val="1200"/>
-              <a:buChar char="-"/>
-            </a:pPr>
-            <a:r>
-              <a:rPr lang="en"/>
-              <a:t>The last song is more melancholy and sad</a:t>
+              <a:t>Footage of Game in Blender</a:t>
             </a:r>
             <a:endParaRPr/>
           </a:p>
         </p:txBody>
       </p:sp>
-      <p:sp>
-        <p:nvSpPr>
-          <p:cNvPr id="446" name="Google Shape;446;p64"/>
-          <p:cNvSpPr txBox="1"/>
-          <p:nvPr>
-            <p:ph type="title"/>
-          </p:nvPr>
-        </p:nvSpPr>
+      <p:pic>
+        <p:nvPicPr>
+          <p:cNvPr id="446" name="Google Shape;446;p64" title="kezzel-pitch-voice-over-intro-slides-no-video-MOCKUP-h265.mp4">
+            <a:hlinkClick r:id="rId3"/>
+          </p:cNvPr>
+          <p:cNvPicPr preferRelativeResize="0"/>
+          <p:nvPr/>
+        </p:nvPicPr>
+        <p:blipFill>
+          <a:blip r:embed="rId4">
+            <a:alphaModFix/>
+          </a:blip>
+          <a:stretch>
+            <a:fillRect/>
+          </a:stretch>
+        </p:blipFill>
         <p:spPr>
           <a:xfrm>
-            <a:off x="311700" y="445025"/>
-            <a:ext cx="8520600" cy="572700"/>
+            <a:off x="0" y="8250"/>
+            <a:ext cx="9144000" cy="5135250"/>
           </a:xfrm>
           <a:prstGeom prst="rect">
             <a:avLst/>
           </a:prstGeom>
+          <a:noFill/>
+          <a:ln>
+            <a:noFill/>
+          </a:ln>
         </p:spPr>
-        <p:txBody>
-          <a:bodyPr anchorCtr="0" anchor="t" bIns="91425" lIns="91425" spcFirstLastPara="1" rIns="91425" wrap="square" tIns="91425">
-            <a:noAutofit/>
-          </a:bodyPr>
-          <a:lstStyle/>
-          <a:p>
-            <a:pPr indent="0" lvl="0" marL="0" rtl="0" algn="l">
-              <a:spcBef>
-                <a:spcPts val="0"/>
-              </a:spcBef>
-              <a:spcAft>
-                <a:spcPts val="0"/>
-              </a:spcAft>
-              <a:buNone/>
-            </a:pPr>
-            <a:r>
-              <a:rPr lang="en"/>
-              <a:t>Sound Design</a:t>
-            </a:r>
-            <a:endParaRPr/>
-          </a:p>
-        </p:txBody>
-      </p:sp>
+      </p:pic>
     </p:spTree>
   </p:cSld>
   <p:clrMapOvr>
     <a:masterClrMapping/>
   </p:clrMapOvr>
+  <p:timing>
+    <p:tnLst>
+      <p:par>
+        <p:cTn dur="indefinite" nodeType="tmRoot" restart="never">
+          <p:childTnLst>
+            <p:seq concurrent="1" nextAc="seek">
+              <p:cTn dur="indefinite" id="2" nodeType="mainSeq">
+                <p:childTnLst>
+                  <p:par>
+                    <p:cTn fill="hold">
+                      <p:stCondLst>
+                        <p:cond delay="indefinite"/>
+                      </p:stCondLst>
+                      <p:childTnLst>
+                        <p:par>
+                          <p:cTn fill="hold">
+                            <p:stCondLst>
+                              <p:cond delay="0"/>
+                            </p:stCondLst>
+                            <p:childTnLst>
+                              <p:par>
+                                <p:cTn fill="hold" nodeType="clickEffect" presetClass="entr" presetID="10" presetSubtype="0">
+                                  <p:stCondLst>
+                                    <p:cond delay="0"/>
+                                  </p:stCondLst>
+                                  <p:childTnLst>
+                                    <p:set>
+                                      <p:cBhvr>
+                                        <p:cTn dur="1" fill="hold">
+                                          <p:stCondLst>
+                                            <p:cond delay="0"/>
+                                          </p:stCondLst>
+                                        </p:cTn>
+                                        <p:tgtEl>
+                                          <p:spTgt spid="446"/>
+                                        </p:tgtEl>
+                                        <p:attrNameLst>
+                                          <p:attrName>style.visibility</p:attrName>
+                                        </p:attrNameLst>
+                                      </p:cBhvr>
+                                      <p:to>
+                                        <p:strVal val="visible"/>
+                                      </p:to>
+                                    </p:set>
+                                    <p:animEffect filter="fade" transition="in">
+                                      <p:cBhvr>
+                                        <p:cTn dur="1000"/>
+                                        <p:tgtEl>
+                                          <p:spTgt spid="446"/>
+                                        </p:tgtEl>
+                                      </p:cBhvr>
+                                    </p:animEffect>
+                                  </p:childTnLst>
+                                </p:cTn>
+                              </p:par>
+                            </p:childTnLst>
+                          </p:cTn>
+                        </p:par>
+                      </p:childTnLst>
+                    </p:cTn>
+                  </p:par>
+                </p:childTnLst>
+              </p:cTn>
+              <p:prevCondLst>
+                <p:cond evt="onPrev">
+                  <p:tgtEl>
+                    <p:sldTgt/>
+                  </p:tgtEl>
+                </p:cond>
+              </p:prevCondLst>
+              <p:nextCondLst>
+                <p:cond evt="onNext">
+                  <p:tgtEl>
+                    <p:sldTgt/>
+                  </p:tgtEl>
+                </p:cond>
+              </p:nextCondLst>
+            </p:seq>
+          </p:childTnLst>
+        </p:cTn>
+      </p:par>
+    </p:tnLst>
+  </p:timing>
 </p:sld>
 </file>
 
@@ -38673,6 +38756,201 @@
           <p:cNvPr id="451" name="Google Shape;451;p65"/>
           <p:cNvSpPr txBox="1"/>
           <p:nvPr>
+            <p:ph idx="1" type="body"/>
+          </p:nvPr>
+        </p:nvSpPr>
+        <p:spPr>
+          <a:xfrm>
+            <a:off x="311700" y="1152475"/>
+            <a:ext cx="8520600" cy="3416400"/>
+          </a:xfrm>
+          <a:prstGeom prst="rect">
+            <a:avLst/>
+          </a:prstGeom>
+        </p:spPr>
+        <p:txBody>
+          <a:bodyPr anchorCtr="0" anchor="t" bIns="91425" lIns="91425" spcFirstLastPara="1" rIns="91425" wrap="square" tIns="91425">
+            <a:noAutofit/>
+          </a:bodyPr>
+          <a:lstStyle/>
+          <a:p>
+            <a:pPr indent="-304800" lvl="0" marL="457200" rtl="0" algn="l">
+              <a:spcBef>
+                <a:spcPts val="0"/>
+              </a:spcBef>
+              <a:spcAft>
+                <a:spcPts val="0"/>
+              </a:spcAft>
+              <a:buSzPts val="1200"/>
+              <a:buChar char="-"/>
+            </a:pPr>
+            <a:r>
+              <a:rPr lang="en"/>
+              <a:t>Retro Style Music and Sound Effects</a:t>
+            </a:r>
+            <a:endParaRPr/>
+          </a:p>
+          <a:p>
+            <a:pPr indent="-304800" lvl="0" marL="457200" rtl="0" algn="l">
+              <a:spcBef>
+                <a:spcPts val="0"/>
+              </a:spcBef>
+              <a:spcAft>
+                <a:spcPts val="0"/>
+              </a:spcAft>
+              <a:buSzPts val="1200"/>
+              <a:buChar char="-"/>
+            </a:pPr>
+            <a:r>
+              <a:rPr lang="en"/>
+              <a:t>Shooting and explosion sound effects</a:t>
+            </a:r>
+            <a:endParaRPr/>
+          </a:p>
+          <a:p>
+            <a:pPr indent="-304800" lvl="0" marL="457200" rtl="0" algn="l">
+              <a:spcBef>
+                <a:spcPts val="0"/>
+              </a:spcBef>
+              <a:spcAft>
+                <a:spcPts val="0"/>
+              </a:spcAft>
+              <a:buSzPts val="1200"/>
+              <a:buChar char="-"/>
+            </a:pPr>
+            <a:r>
+              <a:rPr lang="en"/>
+              <a:t>3 different songs, 1 for title screen, 1 for in game, and 1 left for ending </a:t>
+            </a:r>
+            <a:r>
+              <a:rPr lang="en"/>
+              <a:t>screen or as back up use</a:t>
+            </a:r>
+            <a:endParaRPr/>
+          </a:p>
+          <a:p>
+            <a:pPr indent="-304800" lvl="0" marL="457200" rtl="0" algn="l">
+              <a:spcBef>
+                <a:spcPts val="0"/>
+              </a:spcBef>
+              <a:spcAft>
+                <a:spcPts val="0"/>
+              </a:spcAft>
+              <a:buSzPts val="1200"/>
+              <a:buChar char="-"/>
+            </a:pPr>
+            <a:r>
+              <a:rPr lang="en"/>
+              <a:t>Title song is upbeat</a:t>
+            </a:r>
+            <a:endParaRPr/>
+          </a:p>
+          <a:p>
+            <a:pPr indent="-304800" lvl="0" marL="457200" rtl="0" algn="l">
+              <a:spcBef>
+                <a:spcPts val="0"/>
+              </a:spcBef>
+              <a:spcAft>
+                <a:spcPts val="0"/>
+              </a:spcAft>
+              <a:buSzPts val="1200"/>
+              <a:buChar char="-"/>
+            </a:pPr>
+            <a:r>
+              <a:rPr lang="en"/>
+              <a:t>Ingame song is all around and nonstop</a:t>
+            </a:r>
+            <a:endParaRPr/>
+          </a:p>
+          <a:p>
+            <a:pPr indent="-304800" lvl="0" marL="457200" rtl="0" algn="l">
+              <a:spcBef>
+                <a:spcPts val="0"/>
+              </a:spcBef>
+              <a:spcAft>
+                <a:spcPts val="0"/>
+              </a:spcAft>
+              <a:buSzPts val="1200"/>
+              <a:buChar char="-"/>
+            </a:pPr>
+            <a:r>
+              <a:rPr lang="en"/>
+              <a:t>The last song is more melancholy and sad</a:t>
+            </a:r>
+            <a:endParaRPr/>
+          </a:p>
+        </p:txBody>
+      </p:sp>
+      <p:sp>
+        <p:nvSpPr>
+          <p:cNvPr id="452" name="Google Shape;452;p65"/>
+          <p:cNvSpPr txBox="1"/>
+          <p:nvPr>
+            <p:ph type="title"/>
+          </p:nvPr>
+        </p:nvSpPr>
+        <p:spPr>
+          <a:xfrm>
+            <a:off x="311700" y="445025"/>
+            <a:ext cx="8520600" cy="572700"/>
+          </a:xfrm>
+          <a:prstGeom prst="rect">
+            <a:avLst/>
+          </a:prstGeom>
+        </p:spPr>
+        <p:txBody>
+          <a:bodyPr anchorCtr="0" anchor="t" bIns="91425" lIns="91425" spcFirstLastPara="1" rIns="91425" wrap="square" tIns="91425">
+            <a:noAutofit/>
+          </a:bodyPr>
+          <a:lstStyle/>
+          <a:p>
+            <a:pPr indent="0" lvl="0" marL="0" rtl="0" algn="l">
+              <a:spcBef>
+                <a:spcPts val="0"/>
+              </a:spcBef>
+              <a:spcAft>
+                <a:spcPts val="0"/>
+              </a:spcAft>
+              <a:buNone/>
+            </a:pPr>
+            <a:r>
+              <a:rPr lang="en"/>
+              <a:t>Sound Design</a:t>
+            </a:r>
+            <a:endParaRPr/>
+          </a:p>
+        </p:txBody>
+      </p:sp>
+    </p:spTree>
+  </p:cSld>
+  <p:clrMapOvr>
+    <a:masterClrMapping/>
+  </p:clrMapOvr>
+</p:sld>
+</file>
+
+<file path=ppt/slides/slide12.xml><?xml version="1.0" encoding="utf-8"?>
+<p:sld xmlns:a="http://schemas.openxmlformats.org/drawingml/2006/main" xmlns:r="http://schemas.openxmlformats.org/officeDocument/2006/relationships" xmlns:mc="http://schemas.openxmlformats.org/markup-compatibility/2006" xmlns:mv="urn:schemas-microsoft-com:mac:vml" xmlns:p="http://schemas.openxmlformats.org/presentationml/2006/main" xmlns:c="http://schemas.openxmlformats.org/drawingml/2006/chart" xmlns:dgm="http://schemas.openxmlformats.org/drawingml/2006/diagram" xmlns:o="urn:schemas-microsoft-com:office:office" xmlns:v="urn:schemas-microsoft-com:vml" xmlns:pvml="urn:schemas-microsoft-com:office:powerpoint" xmlns:com="http://schemas.openxmlformats.org/drawingml/2006/compatibility" xmlns:p14="http://schemas.microsoft.com/office/powerpoint/2010/main" xmlns:p15="http://schemas.microsoft.com/office/powerpoint/2012/main" xmlns:ahyp="http://schemas.microsoft.com/office/drawing/2018/hyperlinkcolor">
+  <p:cSld>
+    <p:spTree>
+      <p:nvGrpSpPr>
+        <p:cNvPr id="456" name="Shape 456"/>
+        <p:cNvGrpSpPr/>
+        <p:nvPr/>
+      </p:nvGrpSpPr>
+      <p:grpSpPr>
+        <a:xfrm>
+          <a:off x="0" y="0"/>
+          <a:ext cx="0" cy="0"/>
+          <a:chOff x="0" y="0"/>
+          <a:chExt cx="0" cy="0"/>
+        </a:xfrm>
+      </p:grpSpPr>
+      <p:sp>
+        <p:nvSpPr>
+          <p:cNvPr id="457" name="Google Shape;457;p66"/>
+          <p:cNvSpPr txBox="1"/>
+          <p:nvPr>
             <p:ph type="title"/>
           </p:nvPr>
         </p:nvSpPr>
@@ -38710,7 +38988,7 @@
       </p:sp>
       <p:sp>
         <p:nvSpPr>
-          <p:cNvPr id="452" name="Google Shape;452;p65"/>
+          <p:cNvPr id="458" name="Google Shape;458;p66"/>
           <p:cNvSpPr txBox="1"/>
           <p:nvPr>
             <p:ph idx="1" type="body"/>
@@ -38770,7 +39048,7 @@
       </p:sp>
       <p:pic>
         <p:nvPicPr>
-          <p:cNvPr id="453" name="Google Shape;453;p65"/>
+          <p:cNvPr id="459" name="Google Shape;459;p66"/>
           <p:cNvPicPr preferRelativeResize="0"/>
           <p:nvPr/>
         </p:nvPicPr>
@@ -38805,7 +39083,7 @@
       </p:pic>
       <p:sp>
         <p:nvSpPr>
-          <p:cNvPr id="454" name="Google Shape;454;p65"/>
+          <p:cNvPr id="460" name="Google Shape;460;p66"/>
           <p:cNvSpPr/>
           <p:nvPr/>
         </p:nvSpPr>
@@ -40891,41 +41169,41 @@
 </file>
 
 <file path=ppt/theme/theme1.xml><?xml version="1.0" encoding="utf-8"?>
-<a:theme xmlns:a="http://schemas.openxmlformats.org/drawingml/2006/main" xmlns:r="http://schemas.openxmlformats.org/officeDocument/2006/relationships" name="Investor Pitch">
+<a:theme xmlns:a="http://schemas.openxmlformats.org/drawingml/2006/main" xmlns:r="http://schemas.openxmlformats.org/officeDocument/2006/relationships" name="Simple Light">
   <a:themeElements>
     <a:clrScheme name="Simple Light">
       <a:dk1>
-        <a:srgbClr val="0A3D91"/>
+        <a:srgbClr val="000000"/>
       </a:dk1>
       <a:lt1>
-        <a:srgbClr val="F3F3F3"/>
+        <a:srgbClr val="FFFFFF"/>
       </a:lt1>
       <a:dk2>
-        <a:srgbClr val="1D1D1D"/>
+        <a:srgbClr val="595959"/>
       </a:dk2>
       <a:lt2>
-        <a:srgbClr val="A4C2F4"/>
+        <a:srgbClr val="EEEEEE"/>
       </a:lt2>
       <a:accent1>
-        <a:srgbClr val="FFFFFF"/>
+        <a:srgbClr val="4285F4"/>
       </a:accent1>
       <a:accent2>
-        <a:srgbClr val="0A3D91"/>
+        <a:srgbClr val="212121"/>
       </a:accent2>
       <a:accent3>
-        <a:srgbClr val="1D1D1D"/>
+        <a:srgbClr val="78909C"/>
       </a:accent3>
       <a:accent4>
-        <a:srgbClr val="F6F5EC"/>
+        <a:srgbClr val="FFAB40"/>
       </a:accent4>
       <a:accent5>
-        <a:srgbClr val="0A3D91"/>
+        <a:srgbClr val="0097A7"/>
       </a:accent5>
       <a:accent6>
-        <a:srgbClr val="595959"/>
+        <a:srgbClr val="EEFF41"/>
       </a:accent6>
       <a:hlink>
-        <a:srgbClr val="A4C2F4"/>
+        <a:srgbClr val="0097A7"/>
       </a:hlink>
       <a:folHlink>
         <a:srgbClr val="0097A7"/>
@@ -41170,41 +41448,41 @@
 </file>
 
 <file path=ppt/theme/theme2.xml><?xml version="1.0" encoding="utf-8"?>
-<a:theme xmlns:a="http://schemas.openxmlformats.org/drawingml/2006/main" xmlns:r="http://schemas.openxmlformats.org/officeDocument/2006/relationships" name="Simple Light">
+<a:theme xmlns:a="http://schemas.openxmlformats.org/drawingml/2006/main" xmlns:r="http://schemas.openxmlformats.org/officeDocument/2006/relationships" name="Investor Pitch">
   <a:themeElements>
     <a:clrScheme name="Simple Light">
       <a:dk1>
-        <a:srgbClr val="000000"/>
+        <a:srgbClr val="0A3D91"/>
       </a:dk1>
       <a:lt1>
-        <a:srgbClr val="FFFFFF"/>
+        <a:srgbClr val="F3F3F3"/>
       </a:lt1>
       <a:dk2>
-        <a:srgbClr val="595959"/>
+        <a:srgbClr val="1D1D1D"/>
       </a:dk2>
       <a:lt2>
-        <a:srgbClr val="EEEEEE"/>
+        <a:srgbClr val="A4C2F4"/>
       </a:lt2>
       <a:accent1>
-        <a:srgbClr val="4285F4"/>
+        <a:srgbClr val="FFFFFF"/>
       </a:accent1>
       <a:accent2>
-        <a:srgbClr val="212121"/>
+        <a:srgbClr val="0A3D91"/>
       </a:accent2>
       <a:accent3>
-        <a:srgbClr val="78909C"/>
+        <a:srgbClr val="1D1D1D"/>
       </a:accent3>
       <a:accent4>
-        <a:srgbClr val="FFAB40"/>
+        <a:srgbClr val="F6F5EC"/>
       </a:accent4>
       <a:accent5>
-        <a:srgbClr val="0097A7"/>
+        <a:srgbClr val="0A3D91"/>
       </a:accent5>
       <a:accent6>
-        <a:srgbClr val="EEFF41"/>
+        <a:srgbClr val="595959"/>
       </a:accent6>
       <a:hlink>
-        <a:srgbClr val="0097A7"/>
+        <a:srgbClr val="A4C2F4"/>
       </a:hlink>
       <a:folHlink>
         <a:srgbClr val="0097A7"/>

</xml_diff>